<commit_message>
updated slides with Edith's title page
</commit_message>
<xml_diff>
--- a/01-episode-title/rw-episode-01.pptx
+++ b/01-episode-title/rw-episode-01.pptx
@@ -5,12 +5,13 @@
     <p:sldMasterId id="2147483648" r:id="rId1"/>
   </p:sldMasterIdLst>
   <p:notesMasterIdLst>
-    <p:notesMasterId r:id="rId5"/>
+    <p:notesMasterId r:id="rId6"/>
   </p:notesMasterIdLst>
   <p:sldIdLst>
     <p:sldId id="256" r:id="rId2"/>
-    <p:sldId id="257" r:id="rId3"/>
-    <p:sldId id="258" r:id="rId4"/>
+    <p:sldId id="259" r:id="rId3"/>
+    <p:sldId id="257" r:id="rId4"/>
+    <p:sldId id="258" r:id="rId5"/>
   </p:sldIdLst>
   <p:sldSz cx="24384000" cy="13716000"/>
   <p:notesSz cx="6858000" cy="9144000"/>
@@ -312,6 +313,11 @@
       </a:defRPr>
     </a:lvl9pPr>
   </p:defaultTextStyle>
+  <p:extLst>
+    <p:ext uri="{EFAFB233-063F-42B5-8137-9DF3F51BA10A}">
+      <p15:sldGuideLst xmlns:p15="http://schemas.microsoft.com/office/powerpoint/2012/main"/>
+    </p:ext>
+  </p:extLst>
 </p:presentation>
 </file>
 
@@ -520,6 +526,72 @@
           <a:bodyPr/>
           <a:lstStyle/>
           <a:p>
+            <a:endParaRPr lang="en-AU" dirty="0"/>
+          </a:p>
+        </p:txBody>
+      </p:sp>
+    </p:spTree>
+    <p:extLst>
+      <p:ext uri="{BB962C8B-B14F-4D97-AF65-F5344CB8AC3E}">
+        <p14:creationId xmlns:p14="http://schemas.microsoft.com/office/powerpoint/2010/main" val="1246991142"/>
+      </p:ext>
+    </p:extLst>
+  </p:cSld>
+  <p:clrMapOvr>
+    <a:masterClrMapping/>
+  </p:clrMapOvr>
+</p:notes>
+</file>
+
+<file path=ppt/notesSlides/notesSlide2.xml><?xml version="1.0" encoding="utf-8"?>
+<p:notes xmlns:a="http://schemas.openxmlformats.org/drawingml/2006/main" xmlns:r="http://schemas.openxmlformats.org/officeDocument/2006/relationships" xmlns:p="http://schemas.openxmlformats.org/presentationml/2006/main">
+  <p:cSld>
+    <p:spTree>
+      <p:nvGrpSpPr>
+        <p:cNvPr id="1" name=""/>
+        <p:cNvGrpSpPr/>
+        <p:nvPr/>
+      </p:nvGrpSpPr>
+      <p:grpSpPr>
+        <a:xfrm>
+          <a:off x="0" y="0"/>
+          <a:ext cx="0" cy="0"/>
+          <a:chOff x="0" y="0"/>
+          <a:chExt cx="0" cy="0"/>
+        </a:xfrm>
+      </p:grpSpPr>
+      <p:sp>
+        <p:nvSpPr>
+          <p:cNvPr id="2" name="Slide Image Placeholder 1"/>
+          <p:cNvSpPr>
+            <a:spLocks noGrp="1" noRot="1" noChangeAspect="1"/>
+          </p:cNvSpPr>
+          <p:nvPr>
+            <p:ph type="sldImg"/>
+          </p:nvPr>
+        </p:nvSpPr>
+        <p:spPr>
+          <a:xfrm>
+            <a:off x="381000" y="685800"/>
+            <a:ext cx="6096000" cy="3429000"/>
+          </a:xfrm>
+        </p:spPr>
+      </p:sp>
+      <p:sp>
+        <p:nvSpPr>
+          <p:cNvPr id="3" name="Notes Placeholder 2"/>
+          <p:cNvSpPr>
+            <a:spLocks noGrp="1"/>
+          </p:cNvSpPr>
+          <p:nvPr>
+            <p:ph type="body" idx="1"/>
+          </p:nvPr>
+        </p:nvSpPr>
+        <p:spPr/>
+        <p:txBody>
+          <a:bodyPr/>
+          <a:lstStyle/>
+          <a:p>
             <a:r>
               <a:rPr lang="en-US" dirty="0"/>
               <a:t>Hey everyone, I’m your Unity certified instructor, Myles, and in this video course I’ll be showing you how Pathfinding with </a:t>
@@ -556,7 +628,7 @@
     </p:spTree>
     <p:extLst>
       <p:ext uri="{BB962C8B-B14F-4D97-AF65-F5344CB8AC3E}">
-        <p14:creationId xmlns:p14="http://schemas.microsoft.com/office/powerpoint/2010/main" val="1246991142"/>
+        <p14:creationId xmlns:p14="http://schemas.microsoft.com/office/powerpoint/2010/main" val="2679322282"/>
       </p:ext>
     </p:extLst>
   </p:cSld>
@@ -566,7 +638,7 @@
 </p:notes>
 </file>
 
-<file path=ppt/notesSlides/notesSlide2.xml><?xml version="1.0" encoding="utf-8"?>
+<file path=ppt/notesSlides/notesSlide3.xml><?xml version="1.0" encoding="utf-8"?>
 <p:notes xmlns:a="http://schemas.openxmlformats.org/drawingml/2006/main" xmlns:r="http://schemas.openxmlformats.org/officeDocument/2006/relationships" xmlns:p="http://schemas.openxmlformats.org/presentationml/2006/main">
   <p:cSld>
     <p:spTree>
@@ -636,7 +708,7 @@
 </p:notes>
 </file>
 
-<file path=ppt/notesSlides/notesSlide3.xml><?xml version="1.0" encoding="utf-8"?>
+<file path=ppt/notesSlides/notesSlide4.xml><?xml version="1.0" encoding="utf-8"?>
 <p:notes xmlns:a="http://schemas.openxmlformats.org/drawingml/2006/main" xmlns:r="http://schemas.openxmlformats.org/officeDocument/2006/relationships" xmlns:p="http://schemas.openxmlformats.org/presentationml/2006/main">
   <p:cSld>
     <p:spTree>
@@ -2557,7 +2629,7 @@
           </a:ln>
           <a:extLst>
             <a:ext uri="{C572A759-6A51-4108-AA02-DFA0A04FC94B}">
-              <ma14:wrappingTextBoxFlag xmlns:ma14="http://schemas.microsoft.com/office/mac/drawingml/2011/main" xmlns:a14="http://schemas.microsoft.com/office/drawing/2010/main" xmlns:m="http://schemas.openxmlformats.org/officeDocument/2006/math" xmlns="" val="1"/>
+              <ma14:wrappingTextBoxFlag xmlns="" xmlns:m="http://schemas.openxmlformats.org/officeDocument/2006/math" xmlns:a14="http://schemas.microsoft.com/office/drawing/2010/main" xmlns:ma14="http://schemas.microsoft.com/office/mac/drawingml/2011/main" val="1"/>
             </a:ext>
           </a:extLst>
         </p:spPr>
@@ -2596,7 +2668,7 @@
           </a:ln>
           <a:extLst>
             <a:ext uri="{C572A759-6A51-4108-AA02-DFA0A04FC94B}">
-              <ma14:wrappingTextBoxFlag xmlns:ma14="http://schemas.microsoft.com/office/mac/drawingml/2011/main" xmlns:a14="http://schemas.microsoft.com/office/drawing/2010/main" xmlns:m="http://schemas.openxmlformats.org/officeDocument/2006/math" xmlns="" val="1"/>
+              <ma14:wrappingTextBoxFlag xmlns="" xmlns:m="http://schemas.openxmlformats.org/officeDocument/2006/math" xmlns:a14="http://schemas.microsoft.com/office/drawing/2010/main" xmlns:ma14="http://schemas.microsoft.com/office/mac/drawingml/2011/main" val="1"/>
             </a:ext>
           </a:extLst>
         </p:spPr>
@@ -3412,6 +3484,68 @@
 </file>
 
 <file path=ppt/slides/slide1.xml><?xml version="1.0" encoding="utf-8"?>
+<p:sld xmlns:a="http://schemas.openxmlformats.org/drawingml/2006/main" xmlns:r="http://schemas.openxmlformats.org/officeDocument/2006/relationships" xmlns:p="http://schemas.openxmlformats.org/presentationml/2006/main">
+  <p:cSld>
+    <p:spTree>
+      <p:nvGrpSpPr>
+        <p:cNvPr id="1" name=""/>
+        <p:cNvGrpSpPr/>
+        <p:nvPr/>
+      </p:nvGrpSpPr>
+      <p:grpSpPr>
+        <a:xfrm>
+          <a:off x="0" y="0"/>
+          <a:ext cx="0" cy="0"/>
+          <a:chOff x="0" y="0"/>
+          <a:chExt cx="0" cy="0"/>
+        </a:xfrm>
+      </p:grpSpPr>
+      <p:pic>
+        <p:nvPicPr>
+          <p:cNvPr id="42" name="Picture 41" descr="Graphical user interface, text&#10;&#10;Description automatically generated">
+            <a:extLst>
+              <a:ext uri="{FF2B5EF4-FFF2-40B4-BE49-F238E27FC236}">
+                <a16:creationId xmlns:a16="http://schemas.microsoft.com/office/drawing/2014/main" id="{BD956D2E-3CDC-46E3-9004-FEF674BC2980}"/>
+              </a:ext>
+            </a:extLst>
+          </p:cNvPr>
+          <p:cNvPicPr>
+            <a:picLocks noChangeAspect="1"/>
+          </p:cNvPicPr>
+          <p:nvPr/>
+        </p:nvPicPr>
+        <p:blipFill>
+          <a:blip r:embed="rId3">
+            <a:extLst>
+              <a:ext uri="{28A0092B-C50C-407E-A947-70E740481C1C}">
+                <a14:useLocalDpi xmlns:a14="http://schemas.microsoft.com/office/drawing/2010/main" val="0"/>
+              </a:ext>
+            </a:extLst>
+          </a:blip>
+          <a:stretch>
+            <a:fillRect/>
+          </a:stretch>
+        </p:blipFill>
+        <p:spPr>
+          <a:xfrm>
+            <a:off x="0" y="0"/>
+            <a:ext cx="24384000" cy="13716000"/>
+          </a:xfrm>
+          <a:prstGeom prst="rect">
+            <a:avLst/>
+          </a:prstGeom>
+        </p:spPr>
+      </p:pic>
+    </p:spTree>
+  </p:cSld>
+  <p:clrMapOvr>
+    <a:masterClrMapping/>
+  </p:clrMapOvr>
+  <p:transition spd="med"/>
+</p:sld>
+</file>
+
+<file path=ppt/slides/slide2.xml><?xml version="1.0" encoding="utf-8"?>
 <p:sld xmlns:a="http://schemas.openxmlformats.org/drawingml/2006/main" xmlns:r="http://schemas.openxmlformats.org/officeDocument/2006/relationships" xmlns:p="http://schemas.openxmlformats.org/presentationml/2006/main">
   <p:cSld>
     <p:spTree>
@@ -5203,6 +5337,11 @@
         </p:sp>
       </p:grpSp>
     </p:spTree>
+    <p:extLst>
+      <p:ext uri="{BB962C8B-B14F-4D97-AF65-F5344CB8AC3E}">
+        <p14:creationId xmlns:p14="http://schemas.microsoft.com/office/powerpoint/2010/main" val="1975265459"/>
+      </p:ext>
+    </p:extLst>
   </p:cSld>
   <p:clrMapOvr>
     <a:masterClrMapping/>
@@ -5211,7 +5350,7 @@
 </p:sld>
 </file>
 
-<file path=ppt/slides/slide2.xml><?xml version="1.0" encoding="utf-8"?>
+<file path=ppt/slides/slide3.xml><?xml version="1.0" encoding="utf-8"?>
 <p:sld xmlns:a="http://schemas.openxmlformats.org/drawingml/2006/main" xmlns:r="http://schemas.openxmlformats.org/officeDocument/2006/relationships" xmlns:p="http://schemas.openxmlformats.org/presentationml/2006/main">
   <p:cSld>
     <p:spTree>
@@ -5360,7 +5499,7 @@
 </p:sld>
 </file>
 
-<file path=ppt/slides/slide3.xml><?xml version="1.0" encoding="utf-8"?>
+<file path=ppt/slides/slide4.xml><?xml version="1.0" encoding="utf-8"?>
 <p:sld xmlns:a="http://schemas.openxmlformats.org/drawingml/2006/main" xmlns:r="http://schemas.openxmlformats.org/officeDocument/2006/relationships" xmlns:p="http://schemas.openxmlformats.org/presentationml/2006/main">
   <p:cSld>
     <p:spTree>

</xml_diff>